<commit_message>
Correzioni ad organizzazione del lavoro
</commit_message>
<xml_diff>
--- a/Presentazione/Presentazione 26-01-2018.pptx
+++ b/Presentazione/Presentazione 26-01-2018.pptx
@@ -6231,7 +6231,7 @@
             </a:pPr>
             <a:r>
               <a:rPr lang="it-IT" sz="1800" dirty="0"/>
-              <a:t>Per permettere di tenere traccia del lavoro del team</a:t>
+              <a:t>Tracciamento del lavoro del team</a:t>
             </a:r>
           </a:p>
         </p:txBody>
@@ -6427,12 +6427,8 @@
               </a:spcBef>
             </a:pPr>
             <a:r>
-              <a:rPr lang="it-IT" sz="1800" dirty="0"/>
-              <a:t>Per </a:t>
-            </a:r>
-            <a:r>
               <a:rPr lang="it-IT" sz="1800" dirty="0" err="1"/>
-              <a:t>versionamento</a:t>
+              <a:t>Versionamento</a:t>
             </a:r>
             <a:r>
               <a:rPr lang="it-IT" sz="1800" dirty="0"/>
@@ -7361,7 +7357,7 @@
         </p:nvSpPr>
         <p:spPr>
           <a:xfrm>
-            <a:off x="5838641" y="3714586"/>
+            <a:off x="5986922" y="3714586"/>
             <a:ext cx="4895397" cy="400110"/>
           </a:xfrm>
           <a:prstGeom prst="rect">
@@ -9829,7 +9825,7 @@
         <p:spPr>
           <a:xfrm>
             <a:off x="1624758" y="302189"/>
-            <a:ext cx="7321534" cy="1061829"/>
+            <a:ext cx="7519242" cy="1077218"/>
           </a:xfrm>
           <a:prstGeom prst="rect">
             <a:avLst/>
@@ -9842,7 +9838,7 @@
           <a:lstStyle/>
           <a:p>
             <a:r>
-              <a:rPr lang="en-US" altLang="zh-CN" sz="3100" b="1" dirty="0" err="1">
+              <a:rPr lang="en-US" altLang="zh-CN" sz="3200" b="1" dirty="0" err="1">
                 <a:solidFill>
                   <a:srgbClr val="EE7633"/>
                 </a:solidFill>
@@ -9850,7 +9846,7 @@
               <a:t>Progettazione</a:t>
             </a:r>
             <a:r>
-              <a:rPr lang="zh-CN" altLang="en-US" sz="3100" b="1" dirty="0">
+              <a:rPr lang="zh-CN" altLang="en-US" sz="3200" b="1" dirty="0">
                 <a:solidFill>
                   <a:srgbClr val="EE7633"/>
                 </a:solidFill>
@@ -9858,7 +9854,7 @@
               <a:t> </a:t>
             </a:r>
             <a:r>
-              <a:rPr lang="it-IT" sz="3100" b="1" dirty="0">
+              <a:rPr lang="it-IT" sz="3200" b="1" dirty="0">
                 <a:solidFill>
                   <a:srgbClr val="EE7633"/>
                 </a:solidFill>
@@ -9866,7 +9862,7 @@
               <a:t>di dettaglio e Codi</a:t>
             </a:r>
             <a:r>
-              <a:rPr lang="en-US" altLang="zh-CN" sz="3100" b="1" dirty="0">
+              <a:rPr lang="en-US" altLang="zh-CN" sz="3200" b="1" dirty="0">
                 <a:solidFill>
                   <a:srgbClr val="EE7633"/>
                 </a:solidFill>
@@ -9874,14 +9870,14 @@
               <a:t>fi</a:t>
             </a:r>
             <a:r>
-              <a:rPr lang="it-IT" sz="3100" b="1" dirty="0" err="1">
+              <a:rPr lang="it-IT" sz="3200" b="1" dirty="0" err="1">
                 <a:solidFill>
                   <a:srgbClr val="EE7633"/>
                 </a:solidFill>
               </a:rPr>
               <a:t>ca</a:t>
             </a:r>
-            <a:endParaRPr lang="it-IT" sz="3100" b="1" dirty="0">
+            <a:endParaRPr lang="it-IT" sz="3200" b="1" dirty="0">
               <a:solidFill>
                 <a:srgbClr val="EE7633"/>
               </a:solidFill>
@@ -11300,7 +11296,7 @@
               </a:ln>
               <a:extLst>
                 <a:ext uri="{91240B29-F687-4f45-9708-019B960494DF}">
-                  <a14:hiddenLine xmlns:a14="http://schemas.microsoft.com/office/drawing/2010/main" xmlns="" w="9525">
+                  <a14:hiddenLine xmlns="" xmlns:a14="http://schemas.microsoft.com/office/drawing/2010/main" w="9525">
                     <a:solidFill>
                       <a:srgbClr val="000000"/>
                     </a:solidFill>
@@ -11435,7 +11431,7 @@
               </a:ln>
               <a:extLst>
                 <a:ext uri="{91240B29-F687-4f45-9708-019B960494DF}">
-                  <a14:hiddenLine xmlns:a14="http://schemas.microsoft.com/office/drawing/2010/main" xmlns="" w="9525">
+                  <a14:hiddenLine xmlns="" xmlns:a14="http://schemas.microsoft.com/office/drawing/2010/main" w="9525">
                     <a:solidFill>
                       <a:srgbClr val="000000"/>
                     </a:solidFill>
@@ -11538,7 +11534,7 @@
               </a:ln>
               <a:extLst>
                 <a:ext uri="{91240B29-F687-4f45-9708-019B960494DF}">
-                  <a14:hiddenLine xmlns:a14="http://schemas.microsoft.com/office/drawing/2010/main" xmlns="" w="9525">
+                  <a14:hiddenLine xmlns="" xmlns:a14="http://schemas.microsoft.com/office/drawing/2010/main" w="9525">
                     <a:solidFill>
                       <a:srgbClr val="000000"/>
                     </a:solidFill>
@@ -11682,7 +11678,7 @@
               </a:ln>
               <a:extLst>
                 <a:ext uri="{91240B29-F687-4f45-9708-019B960494DF}">
-                  <a14:hiddenLine xmlns:a14="http://schemas.microsoft.com/office/drawing/2010/main" xmlns="" w="9525">
+                  <a14:hiddenLine xmlns="" xmlns:a14="http://schemas.microsoft.com/office/drawing/2010/main" w="9525">
                     <a:solidFill>
                       <a:srgbClr val="000000"/>
                     </a:solidFill>
@@ -11872,7 +11868,7 @@
               </a:ln>
               <a:extLst>
                 <a:ext uri="{91240B29-F687-4f45-9708-019B960494DF}">
-                  <a14:hiddenLine xmlns:a14="http://schemas.microsoft.com/office/drawing/2010/main" xmlns="" w="9525">
+                  <a14:hiddenLine xmlns="" xmlns:a14="http://schemas.microsoft.com/office/drawing/2010/main" w="9525">
                     <a:solidFill>
                       <a:srgbClr val="000000"/>
                     </a:solidFill>
@@ -16551,7 +16547,7 @@
                 </a:ln>
                 <a:extLst>
                   <a:ext uri="{91240B29-F687-4f45-9708-019B960494DF}">
-                    <a14:hiddenLine xmlns:a14="http://schemas.microsoft.com/office/drawing/2010/main" xmlns="" w="9525">
+                    <a14:hiddenLine xmlns="" xmlns:a14="http://schemas.microsoft.com/office/drawing/2010/main" w="9525">
                       <a:solidFill>
                         <a:srgbClr val="000000"/>
                       </a:solidFill>
@@ -16603,7 +16599,7 @@
                 </a:ln>
                 <a:extLst>
                   <a:ext uri="{91240B29-F687-4f45-9708-019B960494DF}">
-                    <a14:hiddenLine xmlns:a14="http://schemas.microsoft.com/office/drawing/2010/main" xmlns="" w="9525">
+                    <a14:hiddenLine xmlns="" xmlns:a14="http://schemas.microsoft.com/office/drawing/2010/main" w="9525">
                       <a:solidFill>
                         <a:srgbClr val="000000"/>
                       </a:solidFill>
@@ -16655,7 +16651,7 @@
                 </a:ln>
                 <a:extLst>
                   <a:ext uri="{91240B29-F687-4f45-9708-019B960494DF}">
-                    <a14:hiddenLine xmlns:a14="http://schemas.microsoft.com/office/drawing/2010/main" xmlns="" w="9525">
+                    <a14:hiddenLine xmlns="" xmlns:a14="http://schemas.microsoft.com/office/drawing/2010/main" w="9525">
                       <a:solidFill>
                         <a:srgbClr val="000000"/>
                       </a:solidFill>
@@ -16707,7 +16703,7 @@
                 </a:ln>
                 <a:extLst>
                   <a:ext uri="{91240B29-F687-4f45-9708-019B960494DF}">
-                    <a14:hiddenLine xmlns:a14="http://schemas.microsoft.com/office/drawing/2010/main" xmlns="" w="9525">
+                    <a14:hiddenLine xmlns="" xmlns:a14="http://schemas.microsoft.com/office/drawing/2010/main" w="9525">
                       <a:solidFill>
                         <a:srgbClr val="000000"/>
                       </a:solidFill>
@@ -16759,7 +16755,7 @@
                 </a:ln>
                 <a:extLst>
                   <a:ext uri="{91240B29-F687-4f45-9708-019B960494DF}">
-                    <a14:hiddenLine xmlns:a14="http://schemas.microsoft.com/office/drawing/2010/main" xmlns="" w="9525">
+                    <a14:hiddenLine xmlns="" xmlns:a14="http://schemas.microsoft.com/office/drawing/2010/main" w="9525">
                       <a:solidFill>
                         <a:srgbClr val="000000"/>
                       </a:solidFill>
@@ -16894,7 +16890,7 @@
                 </a:ln>
                 <a:extLst>
                   <a:ext uri="{91240B29-F687-4f45-9708-019B960494DF}">
-                    <a14:hiddenLine xmlns:a14="http://schemas.microsoft.com/office/drawing/2010/main" xmlns="" w="9525">
+                    <a14:hiddenLine xmlns="" xmlns:a14="http://schemas.microsoft.com/office/drawing/2010/main" w="9525">
                       <a:solidFill>
                         <a:srgbClr val="000000"/>
                       </a:solidFill>
@@ -20793,7 +20789,7 @@
               </a:ln>
               <a:extLst>
                 <a:ext uri="{91240B29-F687-4f45-9708-019B960494DF}">
-                  <a14:hiddenLine xmlns:a14="http://schemas.microsoft.com/office/drawing/2010/main" xmlns="" w="9525">
+                  <a14:hiddenLine xmlns="" xmlns:a14="http://schemas.microsoft.com/office/drawing/2010/main" w="9525">
                     <a:solidFill>
                       <a:srgbClr val="000000"/>
                     </a:solidFill>
@@ -20928,7 +20924,7 @@
               </a:ln>
               <a:extLst>
                 <a:ext uri="{91240B29-F687-4f45-9708-019B960494DF}">
-                  <a14:hiddenLine xmlns:a14="http://schemas.microsoft.com/office/drawing/2010/main" xmlns="" w="9525">
+                  <a14:hiddenLine xmlns="" xmlns:a14="http://schemas.microsoft.com/office/drawing/2010/main" w="9525">
                     <a:solidFill>
                       <a:srgbClr val="000000"/>
                     </a:solidFill>
@@ -21031,7 +21027,7 @@
               </a:ln>
               <a:extLst>
                 <a:ext uri="{91240B29-F687-4f45-9708-019B960494DF}">
-                  <a14:hiddenLine xmlns:a14="http://schemas.microsoft.com/office/drawing/2010/main" xmlns="" w="9525">
+                  <a14:hiddenLine xmlns="" xmlns:a14="http://schemas.microsoft.com/office/drawing/2010/main" w="9525">
                     <a:solidFill>
                       <a:srgbClr val="000000"/>
                     </a:solidFill>
@@ -21175,7 +21171,7 @@
               </a:ln>
               <a:extLst>
                 <a:ext uri="{91240B29-F687-4f45-9708-019B960494DF}">
-                  <a14:hiddenLine xmlns:a14="http://schemas.microsoft.com/office/drawing/2010/main" xmlns="" w="9525">
+                  <a14:hiddenLine xmlns="" xmlns:a14="http://schemas.microsoft.com/office/drawing/2010/main" w="9525">
                     <a:solidFill>
                       <a:srgbClr val="000000"/>
                     </a:solidFill>
@@ -21365,7 +21361,7 @@
               </a:ln>
               <a:extLst>
                 <a:ext uri="{91240B29-F687-4f45-9708-019B960494DF}">
-                  <a14:hiddenLine xmlns:a14="http://schemas.microsoft.com/office/drawing/2010/main" xmlns="" w="9525">
+                  <a14:hiddenLine xmlns="" xmlns:a14="http://schemas.microsoft.com/office/drawing/2010/main" w="9525">
                     <a:solidFill>
                       <a:srgbClr val="000000"/>
                     </a:solidFill>
@@ -28889,7 +28885,7 @@
               </a:ln>
               <a:extLst>
                 <a:ext uri="{91240B29-F687-4f45-9708-019B960494DF}">
-                  <a14:hiddenLine xmlns:a14="http://schemas.microsoft.com/office/drawing/2010/main" xmlns="" w="9525">
+                  <a14:hiddenLine xmlns="" xmlns:a14="http://schemas.microsoft.com/office/drawing/2010/main" w="9525">
                     <a:solidFill>
                       <a:srgbClr val="000000"/>
                     </a:solidFill>
@@ -29024,7 +29020,7 @@
               </a:ln>
               <a:extLst>
                 <a:ext uri="{91240B29-F687-4f45-9708-019B960494DF}">
-                  <a14:hiddenLine xmlns:a14="http://schemas.microsoft.com/office/drawing/2010/main" xmlns="" w="9525">
+                  <a14:hiddenLine xmlns="" xmlns:a14="http://schemas.microsoft.com/office/drawing/2010/main" w="9525">
                     <a:solidFill>
                       <a:srgbClr val="000000"/>
                     </a:solidFill>
@@ -29127,7 +29123,7 @@
               </a:ln>
               <a:extLst>
                 <a:ext uri="{91240B29-F687-4f45-9708-019B960494DF}">
-                  <a14:hiddenLine xmlns:a14="http://schemas.microsoft.com/office/drawing/2010/main" xmlns="" w="9525">
+                  <a14:hiddenLine xmlns="" xmlns:a14="http://schemas.microsoft.com/office/drawing/2010/main" w="9525">
                     <a:solidFill>
                       <a:srgbClr val="000000"/>
                     </a:solidFill>
@@ -29271,7 +29267,7 @@
               </a:ln>
               <a:extLst>
                 <a:ext uri="{91240B29-F687-4f45-9708-019B960494DF}">
-                  <a14:hiddenLine xmlns:a14="http://schemas.microsoft.com/office/drawing/2010/main" xmlns="" w="9525">
+                  <a14:hiddenLine xmlns="" xmlns:a14="http://schemas.microsoft.com/office/drawing/2010/main" w="9525">
                     <a:solidFill>
                       <a:srgbClr val="000000"/>
                     </a:solidFill>
@@ -29461,7 +29457,7 @@
               </a:ln>
               <a:extLst>
                 <a:ext uri="{91240B29-F687-4f45-9708-019B960494DF}">
-                  <a14:hiddenLine xmlns:a14="http://schemas.microsoft.com/office/drawing/2010/main" xmlns="" w="9525">
+                  <a14:hiddenLine xmlns="" xmlns:a14="http://schemas.microsoft.com/office/drawing/2010/main" w="9525">
                     <a:solidFill>
                       <a:srgbClr val="000000"/>
                     </a:solidFill>
@@ -37208,7 +37204,7 @@
               </a:ln>
               <a:extLst>
                 <a:ext uri="{91240B29-F687-4f45-9708-019B960494DF}">
-                  <a14:hiddenLine xmlns:a14="http://schemas.microsoft.com/office/drawing/2010/main" xmlns="" w="9525">
+                  <a14:hiddenLine xmlns="" xmlns:a14="http://schemas.microsoft.com/office/drawing/2010/main" w="9525">
                     <a:solidFill>
                       <a:srgbClr val="000000"/>
                     </a:solidFill>
@@ -37260,7 +37256,7 @@
               </a:ln>
               <a:extLst>
                 <a:ext uri="{91240B29-F687-4f45-9708-019B960494DF}">
-                  <a14:hiddenLine xmlns:a14="http://schemas.microsoft.com/office/drawing/2010/main" xmlns="" w="9525">
+                  <a14:hiddenLine xmlns="" xmlns:a14="http://schemas.microsoft.com/office/drawing/2010/main" w="9525">
                     <a:solidFill>
                       <a:srgbClr val="000000"/>
                     </a:solidFill>
@@ -37312,7 +37308,7 @@
               </a:ln>
               <a:extLst>
                 <a:ext uri="{91240B29-F687-4f45-9708-019B960494DF}">
-                  <a14:hiddenLine xmlns:a14="http://schemas.microsoft.com/office/drawing/2010/main" xmlns="" w="9525">
+                  <a14:hiddenLine xmlns="" xmlns:a14="http://schemas.microsoft.com/office/drawing/2010/main" w="9525">
                     <a:solidFill>
                       <a:srgbClr val="000000"/>
                     </a:solidFill>
@@ -37364,7 +37360,7 @@
               </a:ln>
               <a:extLst>
                 <a:ext uri="{91240B29-F687-4f45-9708-019B960494DF}">
-                  <a14:hiddenLine xmlns:a14="http://schemas.microsoft.com/office/drawing/2010/main" xmlns="" w="9525">
+                  <a14:hiddenLine xmlns="" xmlns:a14="http://schemas.microsoft.com/office/drawing/2010/main" w="9525">
                     <a:solidFill>
                       <a:srgbClr val="000000"/>
                     </a:solidFill>
@@ -37416,7 +37412,7 @@
               </a:ln>
               <a:extLst>
                 <a:ext uri="{91240B29-F687-4f45-9708-019B960494DF}">
-                  <a14:hiddenLine xmlns:a14="http://schemas.microsoft.com/office/drawing/2010/main" xmlns="" w="9525">
+                  <a14:hiddenLine xmlns="" xmlns:a14="http://schemas.microsoft.com/office/drawing/2010/main" w="9525">
                     <a:solidFill>
                       <a:srgbClr val="000000"/>
                     </a:solidFill>
@@ -37551,7 +37547,7 @@
               </a:ln>
               <a:extLst>
                 <a:ext uri="{91240B29-F687-4f45-9708-019B960494DF}">
-                  <a14:hiddenLine xmlns:a14="http://schemas.microsoft.com/office/drawing/2010/main" xmlns="" w="9525">
+                  <a14:hiddenLine xmlns="" xmlns:a14="http://schemas.microsoft.com/office/drawing/2010/main" w="9525">
                     <a:solidFill>
                       <a:srgbClr val="000000"/>
                     </a:solidFill>
@@ -41450,7 +41446,7 @@
             </a:ln>
             <a:extLst>
               <a:ext uri="{91240B29-F687-4f45-9708-019B960494DF}">
-                <a14:hiddenLine xmlns:a14="http://schemas.microsoft.com/office/drawing/2010/main" xmlns="" w="9525">
+                <a14:hiddenLine xmlns="" xmlns:a14="http://schemas.microsoft.com/office/drawing/2010/main" w="9525">
                   <a:solidFill>
                     <a:srgbClr val="000000"/>
                   </a:solidFill>
@@ -41585,7 +41581,7 @@
             </a:ln>
             <a:extLst>
               <a:ext uri="{91240B29-F687-4f45-9708-019B960494DF}">
-                <a14:hiddenLine xmlns:a14="http://schemas.microsoft.com/office/drawing/2010/main" xmlns="" w="9525">
+                <a14:hiddenLine xmlns="" xmlns:a14="http://schemas.microsoft.com/office/drawing/2010/main" w="9525">
                   <a:solidFill>
                     <a:srgbClr val="000000"/>
                   </a:solidFill>
@@ -41688,7 +41684,7 @@
             </a:ln>
             <a:extLst>
               <a:ext uri="{91240B29-F687-4f45-9708-019B960494DF}">
-                <a14:hiddenLine xmlns:a14="http://schemas.microsoft.com/office/drawing/2010/main" xmlns="" w="9525">
+                <a14:hiddenLine xmlns="" xmlns:a14="http://schemas.microsoft.com/office/drawing/2010/main" w="9525">
                   <a:solidFill>
                     <a:srgbClr val="000000"/>
                   </a:solidFill>
@@ -41832,7 +41828,7 @@
             </a:ln>
             <a:extLst>
               <a:ext uri="{91240B29-F687-4f45-9708-019B960494DF}">
-                <a14:hiddenLine xmlns:a14="http://schemas.microsoft.com/office/drawing/2010/main" xmlns="" w="9525">
+                <a14:hiddenLine xmlns="" xmlns:a14="http://schemas.microsoft.com/office/drawing/2010/main" w="9525">
                   <a:solidFill>
                     <a:srgbClr val="000000"/>
                   </a:solidFill>
@@ -42022,7 +42018,7 @@
             </a:ln>
             <a:extLst>
               <a:ext uri="{91240B29-F687-4f45-9708-019B960494DF}">
-                <a14:hiddenLine xmlns:a14="http://schemas.microsoft.com/office/drawing/2010/main" xmlns="" w="9525">
+                <a14:hiddenLine xmlns="" xmlns:a14="http://schemas.microsoft.com/office/drawing/2010/main" w="9525">
                   <a:solidFill>
                     <a:srgbClr val="000000"/>
                   </a:solidFill>
@@ -46749,21 +46745,21 @@
 </file>
 
 <file path=customXml/item1.xml><?xml version="1.0" encoding="utf-8"?>
+<?mso-contentType ?>
+<FormTemplates xmlns="http://schemas.microsoft.com/sharepoint/v3/contenttype/forms">
+  <Display>DocumentLibraryForm</Display>
+  <Edit>DocumentLibraryForm</Edit>
+  <New>DocumentLibraryForm</New>
+</FormTemplates>
+</file>
+
+<file path=customXml/item2.xml><?xml version="1.0" encoding="utf-8"?>
 <p:properties xmlns:p="http://schemas.microsoft.com/office/2006/metadata/properties" xmlns:xsi="http://www.w3.org/2001/XMLSchema-instance" xmlns:pc="http://schemas.microsoft.com/office/infopath/2007/PartnerControls">
   <documentManagement>
     <_Version xmlns="http://schemas.microsoft.com/sharepoint/v3/fields" xsi:nil="true"/>
     <_Status xmlns="http://schemas.microsoft.com/sharepoint/v3/fields">Not Started</_Status>
   </documentManagement>
 </p:properties>
-</file>
-
-<file path=customXml/item2.xml><?xml version="1.0" encoding="utf-8"?>
-<?mso-contentType ?>
-<FormTemplates xmlns="http://schemas.microsoft.com/sharepoint/v3/contenttype/forms">
-  <Display>DocumentLibraryForm</Display>
-  <Edit>DocumentLibraryForm</Edit>
-  <New>DocumentLibraryForm</New>
-</FormTemplates>
 </file>
 
 <file path=customXml/item3.xml><?xml version="1.0" encoding="utf-8"?>
@@ -46911,6 +46907,14 @@
 </file>
 
 <file path=customXml/itemProps1.xml><?xml version="1.0" encoding="utf-8"?>
+<ds:datastoreItem xmlns:ds="http://schemas.openxmlformats.org/officeDocument/2006/customXml" ds:itemID="{87D2A1B0-FF3E-4009-940D-AED0EB70AA20}">
+  <ds:schemaRefs>
+    <ds:schemaRef ds:uri="http://schemas.microsoft.com/sharepoint/v3/contenttype/forms"/>
+  </ds:schemaRefs>
+</ds:datastoreItem>
+</file>
+
+<file path=customXml/itemProps2.xml><?xml version="1.0" encoding="utf-8"?>
 <ds:datastoreItem xmlns:ds="http://schemas.openxmlformats.org/officeDocument/2006/customXml" ds:itemID="{7B6F2769-7194-4217-93D3-3AF3A4742282}">
   <ds:schemaRefs>
     <ds:schemaRef ds:uri="http://schemas.microsoft.com/office/2006/documentManagement/types"/>
@@ -46922,14 +46926,6 @@
     <ds:schemaRef ds:uri="http://schemas.microsoft.com/sharepoint/v3/fields"/>
     <ds:schemaRef ds:uri="http://www.w3.org/XML/1998/namespace"/>
     <ds:schemaRef ds:uri="http://purl.org/dc/terms/"/>
-  </ds:schemaRefs>
-</ds:datastoreItem>
-</file>
-
-<file path=customXml/itemProps2.xml><?xml version="1.0" encoding="utf-8"?>
-<ds:datastoreItem xmlns:ds="http://schemas.openxmlformats.org/officeDocument/2006/customXml" ds:itemID="{87D2A1B0-FF3E-4009-940D-AED0EB70AA20}">
-  <ds:schemaRefs>
-    <ds:schemaRef ds:uri="http://schemas.microsoft.com/sharepoint/v3/contenttype/forms"/>
   </ds:schemaRefs>
 </ds:datastoreItem>
 </file>

</xml_diff>

<commit_message>
Fix consuntivo in PP e slide
</commit_message>
<xml_diff>
--- a/Presentazione/Presentazione 26-01-2018.pptx
+++ b/Presentazione/Presentazione 26-01-2018.pptx
@@ -149,6 +149,10 @@
     </p:ext>
   </p:extLst>
 </p:presentation>
+</file>
+
+<file path=ppt/revisionInfo.xml><?xml version="1.0" encoding="utf-8"?>
+<p1510:revInfo xmlns:a="http://schemas.openxmlformats.org/drawingml/2006/main" xmlns:r="http://schemas.openxmlformats.org/officeDocument/2006/relationships" xmlns:p1510="http://schemas.microsoft.com/office/powerpoint/2015/10/main"/>
 </file>
 
 <file path=ppt/changesInfos/changesInfo1.xml><?xml version="1.0" encoding="utf-8"?>
@@ -305,7 +309,7 @@
           <pc:sldMk cId="825880097" sldId="272"/>
         </pc:sldMkLst>
         <pc:spChg chg="add">
-          <ac:chgData name="cristiano tessarolo" userId="c36b394d4ec160dc" providerId="LiveId" clId="{7AF579D0-4467-4C07-B5C6-9E169660DA9B}" dt="2018-01-24T21:38:55.862" v="402"/>
+          <ac:chgData name="cristiano tessarolo" userId="c36b394d4ec160dc" providerId="LiveId" clId="{7AF579D0-4467-4C07-B5C6-9E169660DA9B}" dt="2018-01-24T21:38:55.862" v="402" actId="1038"/>
           <ac:spMkLst>
             <pc:docMk/>
             <pc:sldMk cId="825880097" sldId="272"/>
@@ -391,7 +395,7 @@
           <pc:sldMk cId="1788027839" sldId="290"/>
         </pc:sldMkLst>
         <pc:spChg chg="del">
-          <ac:chgData name="cristiano tessarolo" userId="c36b394d4ec160dc" providerId="LiveId" clId="{7AF579D0-4467-4C07-B5C6-9E169660DA9B}" dt="2018-01-24T21:28:22.720" v="57"/>
+          <ac:chgData name="cristiano tessarolo" userId="c36b394d4ec160dc" providerId="LiveId" clId="{7AF579D0-4467-4C07-B5C6-9E169660DA9B}" dt="2018-01-24T21:28:22.720" v="57" actId="1076"/>
           <ac:spMkLst>
             <pc:docMk/>
             <pc:sldMk cId="1788027839" sldId="290"/>
@@ -399,7 +403,7 @@
           </ac:spMkLst>
         </pc:spChg>
         <pc:spChg chg="mod ord">
-          <ac:chgData name="cristiano tessarolo" userId="c36b394d4ec160dc" providerId="LiveId" clId="{7AF579D0-4467-4C07-B5C6-9E169660DA9B}" dt="2018-01-24T21:35:12.939" v="374"/>
+          <ac:chgData name="cristiano tessarolo" userId="c36b394d4ec160dc" providerId="LiveId" clId="{7AF579D0-4467-4C07-B5C6-9E169660DA9B}" dt="2018-01-24T21:35:12.939" v="374" actId="1076"/>
           <ac:spMkLst>
             <pc:docMk/>
             <pc:sldMk cId="1788027839" sldId="290"/>
@@ -407,7 +411,7 @@
           </ac:spMkLst>
         </pc:spChg>
         <pc:spChg chg="add mod">
-          <ac:chgData name="cristiano tessarolo" userId="c36b394d4ec160dc" providerId="LiveId" clId="{7AF579D0-4467-4C07-B5C6-9E169660DA9B}" dt="2018-01-24T21:35:02.118" v="372"/>
+          <ac:chgData name="cristiano tessarolo" userId="c36b394d4ec160dc" providerId="LiveId" clId="{7AF579D0-4467-4C07-B5C6-9E169660DA9B}" dt="2018-01-24T21:35:02.118" v="372" actId="1076"/>
           <ac:spMkLst>
             <pc:docMk/>
             <pc:sldMk cId="1788027839" sldId="290"/>
@@ -423,7 +427,7 @@
           </ac:picMkLst>
         </pc:picChg>
         <pc:picChg chg="del mod">
-          <ac:chgData name="cristiano tessarolo" userId="c36b394d4ec160dc" providerId="LiveId" clId="{7AF579D0-4467-4C07-B5C6-9E169660DA9B}" dt="2018-01-24T21:31:25.271" v="169"/>
+          <ac:chgData name="cristiano tessarolo" userId="c36b394d4ec160dc" providerId="LiveId" clId="{7AF579D0-4467-4C07-B5C6-9E169660DA9B}" dt="2018-01-24T21:31:25.271" v="169" actId="1076"/>
           <ac:picMkLst>
             <pc:docMk/>
             <pc:sldMk cId="1788027839" sldId="290"/>
@@ -485,7 +489,7 @@
           </ac:spMkLst>
         </pc:spChg>
         <pc:spChg chg="add">
-          <ac:chgData name="cristiano tessarolo" userId="c36b394d4ec160dc" providerId="LiveId" clId="{7AF579D0-4467-4C07-B5C6-9E169660DA9B}" dt="2018-01-24T21:37:56.910" v="386"/>
+          <ac:chgData name="cristiano tessarolo" userId="c36b394d4ec160dc" providerId="LiveId" clId="{7AF579D0-4467-4C07-B5C6-9E169660DA9B}" dt="2018-01-24T21:37:56.910" v="386" actId="27309"/>
           <ac:spMkLst>
             <pc:docMk/>
             <pc:sldMk cId="585640194" sldId="294"/>
@@ -493,7 +497,7 @@
           </ac:spMkLst>
         </pc:spChg>
         <pc:spChg chg="add">
-          <ac:chgData name="cristiano tessarolo" userId="c36b394d4ec160dc" providerId="LiveId" clId="{7AF579D0-4467-4C07-B5C6-9E169660DA9B}" dt="2018-01-24T21:37:56.910" v="386"/>
+          <ac:chgData name="cristiano tessarolo" userId="c36b394d4ec160dc" providerId="LiveId" clId="{7AF579D0-4467-4C07-B5C6-9E169660DA9B}" dt="2018-01-24T21:37:56.910" v="386" actId="27309"/>
           <ac:spMkLst>
             <pc:docMk/>
             <pc:sldMk cId="585640194" sldId="294"/>
@@ -1509,7 +1513,7 @@
           <a:p>
             <a:fld id="{2A6D5493-5935-2C4F-8AB7-04879816AC21}" type="datetimeFigureOut">
               <a:rPr kumimoji="1" lang="zh-CN" altLang="en-US" smtClean="0"/>
-              <a:t>2018/1/24</a:t>
+              <a:t>2018/1/25</a:t>
             </a:fld>
             <a:endParaRPr kumimoji="1" lang="zh-CN" altLang="en-US"/>
           </a:p>
@@ -11441,7 +11445,7 @@
               </a:ln>
               <a:extLst>
                 <a:ext uri="{91240B29-F687-4f45-9708-019B960494DF}">
-                  <a14:hiddenLine xmlns="" xmlns:a14="http://schemas.microsoft.com/office/drawing/2010/main" w="9525">
+                  <a14:hiddenLine xmlns:a14="http://schemas.microsoft.com/office/drawing/2010/main" xmlns="" w="9525">
                     <a:solidFill>
                       <a:srgbClr val="000000"/>
                     </a:solidFill>
@@ -11576,7 +11580,7 @@
               </a:ln>
               <a:extLst>
                 <a:ext uri="{91240B29-F687-4f45-9708-019B960494DF}">
-                  <a14:hiddenLine xmlns="" xmlns:a14="http://schemas.microsoft.com/office/drawing/2010/main" w="9525">
+                  <a14:hiddenLine xmlns:a14="http://schemas.microsoft.com/office/drawing/2010/main" xmlns="" w="9525">
                     <a:solidFill>
                       <a:srgbClr val="000000"/>
                     </a:solidFill>
@@ -11679,7 +11683,7 @@
               </a:ln>
               <a:extLst>
                 <a:ext uri="{91240B29-F687-4f45-9708-019B960494DF}">
-                  <a14:hiddenLine xmlns="" xmlns:a14="http://schemas.microsoft.com/office/drawing/2010/main" w="9525">
+                  <a14:hiddenLine xmlns:a14="http://schemas.microsoft.com/office/drawing/2010/main" xmlns="" w="9525">
                     <a:solidFill>
                       <a:srgbClr val="000000"/>
                     </a:solidFill>
@@ -11823,7 +11827,7 @@
               </a:ln>
               <a:extLst>
                 <a:ext uri="{91240B29-F687-4f45-9708-019B960494DF}">
-                  <a14:hiddenLine xmlns="" xmlns:a14="http://schemas.microsoft.com/office/drawing/2010/main" w="9525">
+                  <a14:hiddenLine xmlns:a14="http://schemas.microsoft.com/office/drawing/2010/main" xmlns="" w="9525">
                     <a:solidFill>
                       <a:srgbClr val="000000"/>
                     </a:solidFill>
@@ -12013,7 +12017,7 @@
               </a:ln>
               <a:extLst>
                 <a:ext uri="{91240B29-F687-4f45-9708-019B960494DF}">
-                  <a14:hiddenLine xmlns="" xmlns:a14="http://schemas.microsoft.com/office/drawing/2010/main" w="9525">
+                  <a14:hiddenLine xmlns:a14="http://schemas.microsoft.com/office/drawing/2010/main" xmlns="" w="9525">
                     <a:solidFill>
                       <a:srgbClr val="000000"/>
                     </a:solidFill>
@@ -12241,7 +12245,7 @@
               </a:ln>
               <a:extLst>
                 <a:ext uri="{91240B29-F687-4f45-9708-019B960494DF}">
-                  <a14:hiddenLine xmlns="" xmlns:a14="http://schemas.microsoft.com/office/drawing/2010/main" w="9525">
+                  <a14:hiddenLine xmlns:a14="http://schemas.microsoft.com/office/drawing/2010/main" xmlns="" w="9525">
                     <a:solidFill>
                       <a:srgbClr val="000000"/>
                     </a:solidFill>
@@ -12376,7 +12380,7 @@
               </a:ln>
               <a:extLst>
                 <a:ext uri="{91240B29-F687-4f45-9708-019B960494DF}">
-                  <a14:hiddenLine xmlns="" xmlns:a14="http://schemas.microsoft.com/office/drawing/2010/main" w="9525">
+                  <a14:hiddenLine xmlns:a14="http://schemas.microsoft.com/office/drawing/2010/main" xmlns="" w="9525">
                     <a:solidFill>
                       <a:srgbClr val="000000"/>
                     </a:solidFill>
@@ -12479,7 +12483,7 @@
               </a:ln>
               <a:extLst>
                 <a:ext uri="{91240B29-F687-4f45-9708-019B960494DF}">
-                  <a14:hiddenLine xmlns="" xmlns:a14="http://schemas.microsoft.com/office/drawing/2010/main" w="9525">
+                  <a14:hiddenLine xmlns:a14="http://schemas.microsoft.com/office/drawing/2010/main" xmlns="" w="9525">
                     <a:solidFill>
                       <a:srgbClr val="000000"/>
                     </a:solidFill>
@@ -12623,7 +12627,7 @@
               </a:ln>
               <a:extLst>
                 <a:ext uri="{91240B29-F687-4f45-9708-019B960494DF}">
-                  <a14:hiddenLine xmlns="" xmlns:a14="http://schemas.microsoft.com/office/drawing/2010/main" w="9525">
+                  <a14:hiddenLine xmlns:a14="http://schemas.microsoft.com/office/drawing/2010/main" xmlns="" w="9525">
                     <a:solidFill>
                       <a:srgbClr val="000000"/>
                     </a:solidFill>
@@ -12813,7 +12817,7 @@
               </a:ln>
               <a:extLst>
                 <a:ext uri="{91240B29-F687-4f45-9708-019B960494DF}">
-                  <a14:hiddenLine xmlns="" xmlns:a14="http://schemas.microsoft.com/office/drawing/2010/main" w="9525">
+                  <a14:hiddenLine xmlns:a14="http://schemas.microsoft.com/office/drawing/2010/main" xmlns="" w="9525">
                     <a:solidFill>
                       <a:srgbClr val="000000"/>
                     </a:solidFill>
@@ -17668,7 +17672,7 @@
                 </a:ln>
                 <a:extLst>
                   <a:ext uri="{91240B29-F687-4f45-9708-019B960494DF}">
-                    <a14:hiddenLine xmlns="" xmlns:a14="http://schemas.microsoft.com/office/drawing/2010/main" w="9525">
+                    <a14:hiddenLine xmlns:a14="http://schemas.microsoft.com/office/drawing/2010/main" xmlns="" w="9525">
                       <a:solidFill>
                         <a:srgbClr val="000000"/>
                       </a:solidFill>
@@ -17720,7 +17724,7 @@
                 </a:ln>
                 <a:extLst>
                   <a:ext uri="{91240B29-F687-4f45-9708-019B960494DF}">
-                    <a14:hiddenLine xmlns="" xmlns:a14="http://schemas.microsoft.com/office/drawing/2010/main" w="9525">
+                    <a14:hiddenLine xmlns:a14="http://schemas.microsoft.com/office/drawing/2010/main" xmlns="" w="9525">
                       <a:solidFill>
                         <a:srgbClr val="000000"/>
                       </a:solidFill>
@@ -17772,7 +17776,7 @@
                 </a:ln>
                 <a:extLst>
                   <a:ext uri="{91240B29-F687-4f45-9708-019B960494DF}">
-                    <a14:hiddenLine xmlns="" xmlns:a14="http://schemas.microsoft.com/office/drawing/2010/main" w="9525">
+                    <a14:hiddenLine xmlns:a14="http://schemas.microsoft.com/office/drawing/2010/main" xmlns="" w="9525">
                       <a:solidFill>
                         <a:srgbClr val="000000"/>
                       </a:solidFill>
@@ -17824,7 +17828,7 @@
                 </a:ln>
                 <a:extLst>
                   <a:ext uri="{91240B29-F687-4f45-9708-019B960494DF}">
-                    <a14:hiddenLine xmlns="" xmlns:a14="http://schemas.microsoft.com/office/drawing/2010/main" w="9525">
+                    <a14:hiddenLine xmlns:a14="http://schemas.microsoft.com/office/drawing/2010/main" xmlns="" w="9525">
                       <a:solidFill>
                         <a:srgbClr val="000000"/>
                       </a:solidFill>
@@ -17876,7 +17880,7 @@
                 </a:ln>
                 <a:extLst>
                   <a:ext uri="{91240B29-F687-4f45-9708-019B960494DF}">
-                    <a14:hiddenLine xmlns="" xmlns:a14="http://schemas.microsoft.com/office/drawing/2010/main" w="9525">
+                    <a14:hiddenLine xmlns:a14="http://schemas.microsoft.com/office/drawing/2010/main" xmlns="" w="9525">
                       <a:solidFill>
                         <a:srgbClr val="000000"/>
                       </a:solidFill>
@@ -18011,7 +18015,7 @@
                 </a:ln>
                 <a:extLst>
                   <a:ext uri="{91240B29-F687-4f45-9708-019B960494DF}">
-                    <a14:hiddenLine xmlns="" xmlns:a14="http://schemas.microsoft.com/office/drawing/2010/main" w="9525">
+                    <a14:hiddenLine xmlns:a14="http://schemas.microsoft.com/office/drawing/2010/main" xmlns="" w="9525">
                       <a:solidFill>
                         <a:srgbClr val="000000"/>
                       </a:solidFill>
@@ -21910,7 +21914,7 @@
               </a:ln>
               <a:extLst>
                 <a:ext uri="{91240B29-F687-4f45-9708-019B960494DF}">
-                  <a14:hiddenLine xmlns="" xmlns:a14="http://schemas.microsoft.com/office/drawing/2010/main" w="9525">
+                  <a14:hiddenLine xmlns:a14="http://schemas.microsoft.com/office/drawing/2010/main" xmlns="" w="9525">
                     <a:solidFill>
                       <a:srgbClr val="000000"/>
                     </a:solidFill>
@@ -22045,7 +22049,7 @@
               </a:ln>
               <a:extLst>
                 <a:ext uri="{91240B29-F687-4f45-9708-019B960494DF}">
-                  <a14:hiddenLine xmlns="" xmlns:a14="http://schemas.microsoft.com/office/drawing/2010/main" w="9525">
+                  <a14:hiddenLine xmlns:a14="http://schemas.microsoft.com/office/drawing/2010/main" xmlns="" w="9525">
                     <a:solidFill>
                       <a:srgbClr val="000000"/>
                     </a:solidFill>
@@ -22148,7 +22152,7 @@
               </a:ln>
               <a:extLst>
                 <a:ext uri="{91240B29-F687-4f45-9708-019B960494DF}">
-                  <a14:hiddenLine xmlns="" xmlns:a14="http://schemas.microsoft.com/office/drawing/2010/main" w="9525">
+                  <a14:hiddenLine xmlns:a14="http://schemas.microsoft.com/office/drawing/2010/main" xmlns="" w="9525">
                     <a:solidFill>
                       <a:srgbClr val="000000"/>
                     </a:solidFill>
@@ -22292,7 +22296,7 @@
               </a:ln>
               <a:extLst>
                 <a:ext uri="{91240B29-F687-4f45-9708-019B960494DF}">
-                  <a14:hiddenLine xmlns="" xmlns:a14="http://schemas.microsoft.com/office/drawing/2010/main" w="9525">
+                  <a14:hiddenLine xmlns:a14="http://schemas.microsoft.com/office/drawing/2010/main" xmlns="" w="9525">
                     <a:solidFill>
                       <a:srgbClr val="000000"/>
                     </a:solidFill>
@@ -22482,7 +22486,7 @@
               </a:ln>
               <a:extLst>
                 <a:ext uri="{91240B29-F687-4f45-9708-019B960494DF}">
-                  <a14:hiddenLine xmlns="" xmlns:a14="http://schemas.microsoft.com/office/drawing/2010/main" w="9525">
+                  <a14:hiddenLine xmlns:a14="http://schemas.microsoft.com/office/drawing/2010/main" xmlns="" w="9525">
                     <a:solidFill>
                       <a:srgbClr val="000000"/>
                     </a:solidFill>
@@ -25550,12 +25554,16 @@
             <a:graphicFrameLocks noGrp="1"/>
           </p:cNvGraphicFramePr>
           <p:nvPr>
-            <p:extLst/>
+            <p:extLst>
+              <p:ext uri="{D42A27DB-BD31-4B8C-83A1-F6EECF244321}">
+                <p14:modId xmlns:p14="http://schemas.microsoft.com/office/powerpoint/2010/main" val="2028247183"/>
+              </p:ext>
+            </p:extLst>
           </p:nvPr>
         </p:nvGraphicFramePr>
         <p:xfrm>
-          <a:off x="1624758" y="2538663"/>
-          <a:ext cx="7108710" cy="3606800"/>
+          <a:off x="1624758" y="2165797"/>
+          <a:ext cx="7108710" cy="3977640"/>
         </p:xfrm>
         <a:graphic>
           <a:graphicData uri="http://schemas.openxmlformats.org/drawingml/2006/table">
@@ -25795,7 +25803,7 @@
                       <a:pPr algn="ctr"/>
                       <a:r>
                         <a:rPr lang="it-IT" dirty="0"/>
-                        <a:t>16</a:t>
+                        <a:t>17</a:t>
                       </a:r>
                     </a:p>
                   </a:txBody>
@@ -25842,7 +25850,7 @@
                       <a:pPr algn="ctr"/>
                       <a:r>
                         <a:rPr lang="it-IT" dirty="0"/>
-                        <a:t>21</a:t>
+                        <a:t>22</a:t>
                       </a:r>
                     </a:p>
                   </a:txBody>
@@ -26010,7 +26018,10 @@
                     <a:lstStyle/>
                     <a:p>
                       <a:pPr algn="ctr"/>
-                      <a:endParaRPr lang="it-IT" dirty="0"/>
+                      <a:r>
+                        <a:rPr lang="it-IT" dirty="0"/>
+                        <a:t>2</a:t>
+                      </a:r>
                     </a:p>
                   </a:txBody>
                   <a:tcPr anchor="ctr"/>
@@ -26059,7 +26070,7 @@
                       <a:pPr algn="ctr"/>
                       <a:r>
                         <a:rPr lang="it-IT" dirty="0"/>
-                        <a:t>21</a:t>
+                        <a:t>23</a:t>
                       </a:r>
                     </a:p>
                   </a:txBody>
@@ -26110,7 +26121,7 @@
                       <a:pPr algn="ctr"/>
                       <a:r>
                         <a:rPr lang="it-IT" dirty="0"/>
-                        <a:t>8</a:t>
+                        <a:t>7</a:t>
                       </a:r>
                     </a:p>
                   </a:txBody>
@@ -26124,7 +26135,7 @@
                       <a:pPr algn="ctr"/>
                       <a:r>
                         <a:rPr lang="it-IT" dirty="0"/>
-                        <a:t>6</a:t>
+                        <a:t>7</a:t>
                       </a:r>
                     </a:p>
                   </a:txBody>
@@ -26236,7 +26247,7 @@
                       <a:pPr algn="ctr"/>
                       <a:r>
                         <a:rPr lang="it-IT" dirty="0"/>
-                        <a:t>11</a:t>
+                        <a:t>13</a:t>
                       </a:r>
                     </a:p>
                   </a:txBody>
@@ -26286,7 +26297,7 @@
                       <a:pPr algn="ctr"/>
                       <a:r>
                         <a:rPr lang="it-IT" dirty="0"/>
-                        <a:t>21</a:t>
+                        <a:t>23</a:t>
                       </a:r>
                     </a:p>
                   </a:txBody>
@@ -26531,7 +26542,176 @@
                       <a:pPr algn="l"/>
                       <a:r>
                         <a:rPr lang="it-IT" dirty="0"/>
-                        <a:t>Ore totali ruolo</a:t>
+                        <a:t>Ore totali effettive</a:t>
+                      </a:r>
+                    </a:p>
+                  </a:txBody>
+                  <a:tcPr anchor="ctr">
+                    <a:solidFill>
+                      <a:schemeClr val="accent1">
+                        <a:lumMod val="60000"/>
+                        <a:lumOff val="40000"/>
+                      </a:schemeClr>
+                    </a:solidFill>
+                  </a:tcPr>
+                </a:tc>
+                <a:tc>
+                  <a:txBody>
+                    <a:bodyPr/>
+                    <a:lstStyle/>
+                    <a:p>
+                      <a:pPr algn="ctr"/>
+                      <a:r>
+                        <a:rPr lang="it-IT" dirty="0"/>
+                        <a:t>24</a:t>
+                      </a:r>
+                    </a:p>
+                  </a:txBody>
+                  <a:tcPr anchor="ctr">
+                    <a:solidFill>
+                      <a:schemeClr val="accent1">
+                        <a:lumMod val="60000"/>
+                        <a:lumOff val="40000"/>
+                      </a:schemeClr>
+                    </a:solidFill>
+                  </a:tcPr>
+                </a:tc>
+                <a:tc>
+                  <a:txBody>
+                    <a:bodyPr/>
+                    <a:lstStyle/>
+                    <a:p>
+                      <a:pPr algn="ctr"/>
+                      <a:r>
+                        <a:rPr lang="it-IT" dirty="0"/>
+                        <a:t>19</a:t>
+                      </a:r>
+                    </a:p>
+                  </a:txBody>
+                  <a:tcPr anchor="ctr">
+                    <a:solidFill>
+                      <a:schemeClr val="accent1">
+                        <a:lumMod val="60000"/>
+                        <a:lumOff val="40000"/>
+                      </a:schemeClr>
+                    </a:solidFill>
+                  </a:tcPr>
+                </a:tc>
+                <a:tc>
+                  <a:txBody>
+                    <a:bodyPr/>
+                    <a:lstStyle/>
+                    <a:p>
+                      <a:pPr algn="ctr"/>
+                      <a:r>
+                        <a:rPr lang="it-IT" dirty="0"/>
+                        <a:t>67</a:t>
+                      </a:r>
+                    </a:p>
+                  </a:txBody>
+                  <a:tcPr anchor="ctr">
+                    <a:solidFill>
+                      <a:schemeClr val="accent1">
+                        <a:lumMod val="60000"/>
+                        <a:lumOff val="40000"/>
+                      </a:schemeClr>
+                    </a:solidFill>
+                  </a:tcPr>
+                </a:tc>
+                <a:tc>
+                  <a:txBody>
+                    <a:bodyPr/>
+                    <a:lstStyle/>
+                    <a:p>
+                      <a:pPr algn="ctr"/>
+                      <a:endParaRPr lang="it-IT" dirty="0"/>
+                    </a:p>
+                  </a:txBody>
+                  <a:tcPr anchor="ctr">
+                    <a:solidFill>
+                      <a:schemeClr val="accent1">
+                        <a:lumMod val="60000"/>
+                        <a:lumOff val="40000"/>
+                      </a:schemeClr>
+                    </a:solidFill>
+                  </a:tcPr>
+                </a:tc>
+                <a:tc>
+                  <a:txBody>
+                    <a:bodyPr/>
+                    <a:lstStyle/>
+                    <a:p>
+                      <a:pPr algn="ctr"/>
+                      <a:endParaRPr lang="it-IT" dirty="0"/>
+                    </a:p>
+                  </a:txBody>
+                  <a:tcPr anchor="ctr">
+                    <a:solidFill>
+                      <a:schemeClr val="accent1">
+                        <a:lumMod val="60000"/>
+                        <a:lumOff val="40000"/>
+                      </a:schemeClr>
+                    </a:solidFill>
+                  </a:tcPr>
+                </a:tc>
+                <a:tc>
+                  <a:txBody>
+                    <a:bodyPr/>
+                    <a:lstStyle/>
+                    <a:p>
+                      <a:pPr algn="ctr"/>
+                      <a:r>
+                        <a:rPr lang="it-IT" dirty="0"/>
+                        <a:t>46</a:t>
+                      </a:r>
+                    </a:p>
+                  </a:txBody>
+                  <a:tcPr anchor="ctr">
+                    <a:solidFill>
+                      <a:schemeClr val="accent1">
+                        <a:lumMod val="60000"/>
+                        <a:lumOff val="40000"/>
+                      </a:schemeClr>
+                    </a:solidFill>
+                  </a:tcPr>
+                </a:tc>
+                <a:tc>
+                  <a:txBody>
+                    <a:bodyPr/>
+                    <a:lstStyle/>
+                    <a:p>
+                      <a:pPr algn="ctr"/>
+                      <a:r>
+                        <a:rPr lang="it-IT" dirty="0"/>
+                        <a:t>156</a:t>
+                      </a:r>
+                    </a:p>
+                  </a:txBody>
+                  <a:tcPr anchor="ctr">
+                    <a:solidFill>
+                      <a:schemeClr val="accent1">
+                        <a:lumMod val="60000"/>
+                        <a:lumOff val="40000"/>
+                      </a:schemeClr>
+                    </a:solidFill>
+                  </a:tcPr>
+                </a:tc>
+                <a:extLst>
+                  <a:ext uri="{0D108BD9-81ED-4DB2-BD59-A6C34878D82A}">
+                    <a16:rowId xmlns:a16="http://schemas.microsoft.com/office/drawing/2014/main" val="10008"/>
+                  </a:ext>
+                </a:extLst>
+              </a:tr>
+              <a:tr h="370840">
+                <a:tc>
+                  <a:txBody>
+                    <a:bodyPr/>
+                    <a:lstStyle/>
+                    <a:p>
+                      <a:pPr algn="l"/>
+                      <a:r>
+                        <a:rPr lang="it-IT" dirty="0"/>
+                        <a:t>Ore totali previste</a:t>
                       </a:r>
                     </a:p>
                   </a:txBody>
@@ -26687,7 +26867,7 @@
                 </a:tc>
                 <a:extLst>
                   <a:ext uri="{0D108BD9-81ED-4DB2-BD59-A6C34878D82A}">
-                    <a16:rowId xmlns:a16="http://schemas.microsoft.com/office/drawing/2014/main" val="10008"/>
+                    <a16:rowId xmlns:a16="http://schemas.microsoft.com/office/drawing/2014/main" val="4035107283"/>
                   </a:ext>
                 </a:extLst>
               </a:tr>
@@ -26943,34 +27123,13 @@
           <a:lstStyle/>
           <a:p>
             <a:r>
-              <a:rPr lang="it-IT" sz="3100" b="1">
+              <a:rPr lang="it-IT" sz="3100" b="1" dirty="0">
                 <a:solidFill>
                   <a:srgbClr val="3E846F"/>
                 </a:solidFill>
               </a:rPr>
-              <a:t>Analisi </a:t>
+              <a:t>Analisi dei costi per ruolo in relazione all’ingresso in RR</a:t>
             </a:r>
-            <a:r>
-              <a:rPr lang="it-IT" sz="3100" b="1" dirty="0">
-                <a:solidFill>
-                  <a:srgbClr val="3E846F"/>
-                </a:solidFill>
-              </a:rPr>
-              <a:t>nel dettaglio delle ore suddivise per ruolo per l’ingresso </a:t>
-            </a:r>
-            <a:r>
-              <a:rPr lang="it-IT" sz="3100" b="1">
-                <a:solidFill>
-                  <a:srgbClr val="3E846F"/>
-                </a:solidFill>
-              </a:rPr>
-              <a:t>in RR</a:t>
-            </a:r>
-            <a:endParaRPr lang="it-IT" sz="3100" b="1" dirty="0">
-              <a:solidFill>
-                <a:srgbClr val="3E846F"/>
-              </a:solidFill>
-            </a:endParaRPr>
           </a:p>
         </p:txBody>
       </p:sp>
@@ -27109,14 +27268,14 @@
           <p:nvPr>
             <p:extLst>
               <p:ext uri="{D42A27DB-BD31-4B8C-83A1-F6EECF244321}">
-                <p14:modId xmlns:p14="http://schemas.microsoft.com/office/powerpoint/2010/main" val="3601715244"/>
+                <p14:modId xmlns:p14="http://schemas.microsoft.com/office/powerpoint/2010/main" val="3462257258"/>
               </p:ext>
             </p:extLst>
           </p:nvPr>
         </p:nvGraphicFramePr>
         <p:xfrm>
-          <a:off x="2860387" y="3033695"/>
-          <a:ext cx="4767635" cy="2966720"/>
+          <a:off x="1721011" y="2423977"/>
+          <a:ext cx="6818224" cy="3418840"/>
         </p:xfrm>
         <a:graphic>
           <a:graphicData uri="http://schemas.openxmlformats.org/drawingml/2006/table">
@@ -27125,24 +27284,31 @@
                 <a:tableStyleId>{5C22544A-7EE6-4342-B048-85BDC9FD1C3A}</a:tableStyleId>
               </a:tblPr>
               <a:tblGrid>
-                <a:gridCol w="2695417">
+                <a:gridCol w="2965388">
                   <a:extLst>
                     <a:ext uri="{9D8B030D-6E8A-4147-A177-3AD203B41FA5}">
                       <a16:colId xmlns:a16="http://schemas.microsoft.com/office/drawing/2014/main" val="20000"/>
                     </a:ext>
                   </a:extLst>
                 </a:gridCol>
-                <a:gridCol w="642365">
+                <a:gridCol w="706704">
                   <a:extLst>
                     <a:ext uri="{9D8B030D-6E8A-4147-A177-3AD203B41FA5}">
                       <a16:colId xmlns:a16="http://schemas.microsoft.com/office/drawing/2014/main" val="20001"/>
                     </a:ext>
                   </a:extLst>
                 </a:gridCol>
-                <a:gridCol w="1429853">
+                <a:gridCol w="1573066">
                   <a:extLst>
                     <a:ext uri="{9D8B030D-6E8A-4147-A177-3AD203B41FA5}">
                       <a16:colId xmlns:a16="http://schemas.microsoft.com/office/drawing/2014/main" val="20002"/>
+                    </a:ext>
+                  </a:extLst>
+                </a:gridCol>
+                <a:gridCol w="1573066">
+                  <a:extLst>
+                    <a:ext uri="{9D8B030D-6E8A-4147-A177-3AD203B41FA5}">
+                      <a16:colId xmlns:a16="http://schemas.microsoft.com/office/drawing/2014/main" val="1907140843"/>
                     </a:ext>
                   </a:extLst>
                 </a:gridCol>
@@ -27183,8 +27349,22 @@
                     <a:p>
                       <a:pPr algn="ctr"/>
                       <a:r>
-                        <a:rPr lang="it-IT" dirty="0"/>
-                        <a:t>Costi in €</a:t>
+                        <a:rPr lang="it-IT" sz="1600" dirty="0"/>
+                        <a:t>Costi effettivi in €</a:t>
+                      </a:r>
+                    </a:p>
+                  </a:txBody>
+                  <a:tcPr anchor="ctr"/>
+                </a:tc>
+                <a:tc>
+                  <a:txBody>
+                    <a:bodyPr/>
+                    <a:lstStyle/>
+                    <a:p>
+                      <a:pPr algn="ctr"/>
+                      <a:r>
+                        <a:rPr lang="it-IT" sz="1600" dirty="0"/>
+                        <a:t>Costi preventivati in €</a:t>
                       </a:r>
                     </a:p>
                   </a:txBody>
@@ -27238,6 +27418,20 @@
                   </a:txBody>
                   <a:tcPr anchor="ctr"/>
                 </a:tc>
+                <a:tc>
+                  <a:txBody>
+                    <a:bodyPr/>
+                    <a:lstStyle/>
+                    <a:p>
+                      <a:pPr algn="r"/>
+                      <a:r>
+                        <a:rPr lang="it-IT" dirty="0"/>
+                        <a:t>720,00</a:t>
+                      </a:r>
+                    </a:p>
+                  </a:txBody>
+                  <a:tcPr anchor="ctr"/>
+                </a:tc>
                 <a:extLst>
                   <a:ext uri="{0D108BD9-81ED-4DB2-BD59-A6C34878D82A}">
                     <a16:rowId xmlns:a16="http://schemas.microsoft.com/office/drawing/2014/main" val="10001"/>
@@ -27266,7 +27460,21 @@
                       <a:pPr algn="ctr"/>
                       <a:r>
                         <a:rPr lang="it-IT" dirty="0"/>
-                        <a:t>20</a:t>
+                        <a:t>19</a:t>
+                      </a:r>
+                    </a:p>
+                  </a:txBody>
+                  <a:tcPr anchor="ctr"/>
+                </a:tc>
+                <a:tc>
+                  <a:txBody>
+                    <a:bodyPr/>
+                    <a:lstStyle/>
+                    <a:p>
+                      <a:pPr algn="r"/>
+                      <a:r>
+                        <a:rPr lang="it-IT" dirty="0"/>
+                        <a:t>380,00</a:t>
                       </a:r>
                     </a:p>
                   </a:txBody>
@@ -27314,7 +27522,21 @@
                       <a:pPr algn="ctr"/>
                       <a:r>
                         <a:rPr lang="it-IT" dirty="0"/>
-                        <a:t>61</a:t>
+                        <a:t>67</a:t>
+                      </a:r>
+                    </a:p>
+                  </a:txBody>
+                  <a:tcPr anchor="ctr"/>
+                </a:tc>
+                <a:tc>
+                  <a:txBody>
+                    <a:bodyPr/>
+                    <a:lstStyle/>
+                    <a:p>
+                      <a:pPr algn="r"/>
+                      <a:r>
+                        <a:rPr lang="it-IT" dirty="0"/>
+                        <a:t>1675,00</a:t>
                       </a:r>
                     </a:p>
                   </a:txBody>
@@ -27376,6 +27598,17 @@
                   </a:txBody>
                   <a:tcPr anchor="ctr"/>
                 </a:tc>
+                <a:tc>
+                  <a:txBody>
+                    <a:bodyPr/>
+                    <a:lstStyle/>
+                    <a:p>
+                      <a:pPr algn="r"/>
+                      <a:endParaRPr lang="it-IT" dirty="0"/>
+                    </a:p>
+                  </a:txBody>
+                  <a:tcPr anchor="ctr"/>
+                </a:tc>
                 <a:extLst>
                   <a:ext uri="{0D108BD9-81ED-4DB2-BD59-A6C34878D82A}">
                     <a16:rowId xmlns:a16="http://schemas.microsoft.com/office/drawing/2014/main" val="10004"/>
@@ -27402,6 +27635,17 @@
                     <a:lstStyle/>
                     <a:p>
                       <a:pPr algn="ctr"/>
+                      <a:endParaRPr lang="it-IT" dirty="0"/>
+                    </a:p>
+                  </a:txBody>
+                  <a:tcPr anchor="ctr"/>
+                </a:tc>
+                <a:tc>
+                  <a:txBody>
+                    <a:bodyPr/>
+                    <a:lstStyle/>
+                    <a:p>
+                      <a:pPr algn="r"/>
                       <a:endParaRPr lang="it-IT" dirty="0"/>
                     </a:p>
                   </a:txBody>
@@ -27466,6 +27710,20 @@
                   </a:txBody>
                   <a:tcPr anchor="ctr"/>
                 </a:tc>
+                <a:tc>
+                  <a:txBody>
+                    <a:bodyPr/>
+                    <a:lstStyle/>
+                    <a:p>
+                      <a:pPr algn="r"/>
+                      <a:r>
+                        <a:rPr lang="it-IT" dirty="0"/>
+                        <a:t>690,00</a:t>
+                      </a:r>
+                    </a:p>
+                  </a:txBody>
+                  <a:tcPr anchor="ctr"/>
+                </a:tc>
                 <a:extLst>
                   <a:ext uri="{0D108BD9-81ED-4DB2-BD59-A6C34878D82A}">
                     <a16:rowId xmlns:a16="http://schemas.microsoft.com/office/drawing/2014/main" val="10006"/>
@@ -27502,6 +27760,27 @@
                       <a:r>
                         <a:rPr lang="it-IT" dirty="0"/>
                         <a:t>151</a:t>
+                      </a:r>
+                    </a:p>
+                  </a:txBody>
+                  <a:tcPr anchor="ctr">
+                    <a:solidFill>
+                      <a:schemeClr val="accent1">
+                        <a:lumMod val="60000"/>
+                        <a:lumOff val="40000"/>
+                      </a:schemeClr>
+                    </a:solidFill>
+                  </a:tcPr>
+                </a:tc>
+                <a:tc>
+                  <a:txBody>
+                    <a:bodyPr/>
+                    <a:lstStyle/>
+                    <a:p>
+                      <a:pPr algn="r"/>
+                      <a:r>
+                        <a:rPr lang="it-IT" dirty="0"/>
+                        <a:t>3465,00</a:t>
                       </a:r>
                     </a:p>
                   </a:txBody>
@@ -30006,7 +30285,7 @@
               </a:ln>
               <a:extLst>
                 <a:ext uri="{91240B29-F687-4f45-9708-019B960494DF}">
-                  <a14:hiddenLine xmlns="" xmlns:a14="http://schemas.microsoft.com/office/drawing/2010/main" w="9525">
+                  <a14:hiddenLine xmlns:a14="http://schemas.microsoft.com/office/drawing/2010/main" xmlns="" w="9525">
                     <a:solidFill>
                       <a:srgbClr val="000000"/>
                     </a:solidFill>
@@ -30141,7 +30420,7 @@
               </a:ln>
               <a:extLst>
                 <a:ext uri="{91240B29-F687-4f45-9708-019B960494DF}">
-                  <a14:hiddenLine xmlns="" xmlns:a14="http://schemas.microsoft.com/office/drawing/2010/main" w="9525">
+                  <a14:hiddenLine xmlns:a14="http://schemas.microsoft.com/office/drawing/2010/main" xmlns="" w="9525">
                     <a:solidFill>
                       <a:srgbClr val="000000"/>
                     </a:solidFill>
@@ -30244,7 +30523,7 @@
               </a:ln>
               <a:extLst>
                 <a:ext uri="{91240B29-F687-4f45-9708-019B960494DF}">
-                  <a14:hiddenLine xmlns="" xmlns:a14="http://schemas.microsoft.com/office/drawing/2010/main" w="9525">
+                  <a14:hiddenLine xmlns:a14="http://schemas.microsoft.com/office/drawing/2010/main" xmlns="" w="9525">
                     <a:solidFill>
                       <a:srgbClr val="000000"/>
                     </a:solidFill>
@@ -30388,7 +30667,7 @@
               </a:ln>
               <a:extLst>
                 <a:ext uri="{91240B29-F687-4f45-9708-019B960494DF}">
-                  <a14:hiddenLine xmlns="" xmlns:a14="http://schemas.microsoft.com/office/drawing/2010/main" w="9525">
+                  <a14:hiddenLine xmlns:a14="http://schemas.microsoft.com/office/drawing/2010/main" xmlns="" w="9525">
                     <a:solidFill>
                       <a:srgbClr val="000000"/>
                     </a:solidFill>
@@ -30578,7 +30857,7 @@
               </a:ln>
               <a:extLst>
                 <a:ext uri="{91240B29-F687-4f45-9708-019B960494DF}">
-                  <a14:hiddenLine xmlns="" xmlns:a14="http://schemas.microsoft.com/office/drawing/2010/main" w="9525">
+                  <a14:hiddenLine xmlns:a14="http://schemas.microsoft.com/office/drawing/2010/main" xmlns="" w="9525">
                     <a:solidFill>
                       <a:srgbClr val="000000"/>
                     </a:solidFill>
@@ -38325,7 +38604,7 @@
               </a:ln>
               <a:extLst>
                 <a:ext uri="{91240B29-F687-4f45-9708-019B960494DF}">
-                  <a14:hiddenLine xmlns="" xmlns:a14="http://schemas.microsoft.com/office/drawing/2010/main" w="9525">
+                  <a14:hiddenLine xmlns:a14="http://schemas.microsoft.com/office/drawing/2010/main" xmlns="" w="9525">
                     <a:solidFill>
                       <a:srgbClr val="000000"/>
                     </a:solidFill>
@@ -38377,7 +38656,7 @@
               </a:ln>
               <a:extLst>
                 <a:ext uri="{91240B29-F687-4f45-9708-019B960494DF}">
-                  <a14:hiddenLine xmlns="" xmlns:a14="http://schemas.microsoft.com/office/drawing/2010/main" w="9525">
+                  <a14:hiddenLine xmlns:a14="http://schemas.microsoft.com/office/drawing/2010/main" xmlns="" w="9525">
                     <a:solidFill>
                       <a:srgbClr val="000000"/>
                     </a:solidFill>
@@ -38429,7 +38708,7 @@
               </a:ln>
               <a:extLst>
                 <a:ext uri="{91240B29-F687-4f45-9708-019B960494DF}">
-                  <a14:hiddenLine xmlns="" xmlns:a14="http://schemas.microsoft.com/office/drawing/2010/main" w="9525">
+                  <a14:hiddenLine xmlns:a14="http://schemas.microsoft.com/office/drawing/2010/main" xmlns="" w="9525">
                     <a:solidFill>
                       <a:srgbClr val="000000"/>
                     </a:solidFill>
@@ -38481,7 +38760,7 @@
               </a:ln>
               <a:extLst>
                 <a:ext uri="{91240B29-F687-4f45-9708-019B960494DF}">
-                  <a14:hiddenLine xmlns="" xmlns:a14="http://schemas.microsoft.com/office/drawing/2010/main" w="9525">
+                  <a14:hiddenLine xmlns:a14="http://schemas.microsoft.com/office/drawing/2010/main" xmlns="" w="9525">
                     <a:solidFill>
                       <a:srgbClr val="000000"/>
                     </a:solidFill>
@@ -38533,7 +38812,7 @@
               </a:ln>
               <a:extLst>
                 <a:ext uri="{91240B29-F687-4f45-9708-019B960494DF}">
-                  <a14:hiddenLine xmlns="" xmlns:a14="http://schemas.microsoft.com/office/drawing/2010/main" w="9525">
+                  <a14:hiddenLine xmlns:a14="http://schemas.microsoft.com/office/drawing/2010/main" xmlns="" w="9525">
                     <a:solidFill>
                       <a:srgbClr val="000000"/>
                     </a:solidFill>
@@ -38668,7 +38947,7 @@
               </a:ln>
               <a:extLst>
                 <a:ext uri="{91240B29-F687-4f45-9708-019B960494DF}">
-                  <a14:hiddenLine xmlns="" xmlns:a14="http://schemas.microsoft.com/office/drawing/2010/main" w="9525">
+                  <a14:hiddenLine xmlns:a14="http://schemas.microsoft.com/office/drawing/2010/main" xmlns="" w="9525">
                     <a:solidFill>
                       <a:srgbClr val="000000"/>
                     </a:solidFill>
@@ -42567,7 +42846,7 @@
             </a:ln>
             <a:extLst>
               <a:ext uri="{91240B29-F687-4f45-9708-019B960494DF}">
-                <a14:hiddenLine xmlns="" xmlns:a14="http://schemas.microsoft.com/office/drawing/2010/main" w="9525">
+                <a14:hiddenLine xmlns:a14="http://schemas.microsoft.com/office/drawing/2010/main" xmlns="" w="9525">
                   <a:solidFill>
                     <a:srgbClr val="000000"/>
                   </a:solidFill>
@@ -42702,7 +42981,7 @@
             </a:ln>
             <a:extLst>
               <a:ext uri="{91240B29-F687-4f45-9708-019B960494DF}">
-                <a14:hiddenLine xmlns="" xmlns:a14="http://schemas.microsoft.com/office/drawing/2010/main" w="9525">
+                <a14:hiddenLine xmlns:a14="http://schemas.microsoft.com/office/drawing/2010/main" xmlns="" w="9525">
                   <a:solidFill>
                     <a:srgbClr val="000000"/>
                   </a:solidFill>
@@ -42805,7 +43084,7 @@
             </a:ln>
             <a:extLst>
               <a:ext uri="{91240B29-F687-4f45-9708-019B960494DF}">
-                <a14:hiddenLine xmlns="" xmlns:a14="http://schemas.microsoft.com/office/drawing/2010/main" w="9525">
+                <a14:hiddenLine xmlns:a14="http://schemas.microsoft.com/office/drawing/2010/main" xmlns="" w="9525">
                   <a:solidFill>
                     <a:srgbClr val="000000"/>
                   </a:solidFill>
@@ -42949,7 +43228,7 @@
             </a:ln>
             <a:extLst>
               <a:ext uri="{91240B29-F687-4f45-9708-019B960494DF}">
-                <a14:hiddenLine xmlns="" xmlns:a14="http://schemas.microsoft.com/office/drawing/2010/main" w="9525">
+                <a14:hiddenLine xmlns:a14="http://schemas.microsoft.com/office/drawing/2010/main" xmlns="" w="9525">
                   <a:solidFill>
                     <a:srgbClr val="000000"/>
                   </a:solidFill>
@@ -43139,7 +43418,7 @@
             </a:ln>
             <a:extLst>
               <a:ext uri="{91240B29-F687-4f45-9708-019B960494DF}">
-                <a14:hiddenLine xmlns="" xmlns:a14="http://schemas.microsoft.com/office/drawing/2010/main" w="9525">
+                <a14:hiddenLine xmlns:a14="http://schemas.microsoft.com/office/drawing/2010/main" xmlns="" w="9525">
                   <a:solidFill>
                     <a:srgbClr val="000000"/>
                   </a:solidFill>
@@ -47866,15 +48145,6 @@
 </file>
 
 <file path=customXml/item1.xml><?xml version="1.0" encoding="utf-8"?>
-<p:properties xmlns:p="http://schemas.microsoft.com/office/2006/metadata/properties" xmlns:xsi="http://www.w3.org/2001/XMLSchema-instance" xmlns:pc="http://schemas.microsoft.com/office/infopath/2007/PartnerControls">
-  <documentManagement>
-    <_Version xmlns="http://schemas.microsoft.com/sharepoint/v3/fields" xsi:nil="true"/>
-    <_Status xmlns="http://schemas.microsoft.com/sharepoint/v3/fields">Not Started</_Status>
-  </documentManagement>
-</p:properties>
-</file>
-
-<file path=customXml/item2.xml><?xml version="1.0" encoding="utf-8"?>
 <ct:contentTypeSchema xmlns:ct="http://schemas.microsoft.com/office/2006/metadata/contentType" xmlns:ma="http://schemas.microsoft.com/office/2006/metadata/properties/metaAttributes" ct:_="" ma:_="" ma:contentTypeName="Document" ma:contentTypeID="0x0101000DE64AEEDD9B7A4D93545ACBE97D4615" ma:contentTypeVersion="2" ma:contentTypeDescription="Create a new document." ma:contentTypeScope="" ma:versionID="f49002b78e3a4a71b814eef46a983816">
   <xsd:schema xmlns:xsd="http://www.w3.org/2001/XMLSchema" xmlns:xs="http://www.w3.org/2001/XMLSchema" xmlns:p="http://schemas.microsoft.com/office/2006/metadata/properties" xmlns:ns2="http://schemas.microsoft.com/sharepoint/v3/fields" targetNamespace="http://schemas.microsoft.com/office/2006/metadata/properties" ma:root="true" ma:fieldsID="38f6db2dd0d9a0cf6a8dc37be32b365b" ns2:_="">
     <xsd:import namespace="http://schemas.microsoft.com/sharepoint/v3/fields"/>
@@ -48018,6 +48288,15 @@
 </ct:contentTypeSchema>
 </file>
 
+<file path=customXml/item2.xml><?xml version="1.0" encoding="utf-8"?>
+<p:properties xmlns:p="http://schemas.microsoft.com/office/2006/metadata/properties" xmlns:xsi="http://www.w3.org/2001/XMLSchema-instance" xmlns:pc="http://schemas.microsoft.com/office/infopath/2007/PartnerControls">
+  <documentManagement>
+    <_Version xmlns="http://schemas.microsoft.com/sharepoint/v3/fields" xsi:nil="true"/>
+    <_Status xmlns="http://schemas.microsoft.com/sharepoint/v3/fields">Not Started</_Status>
+  </documentManagement>
+</p:properties>
+</file>
+
 <file path=customXml/item3.xml><?xml version="1.0" encoding="utf-8"?>
 <?mso-contentType ?>
 <FormTemplates xmlns="http://schemas.microsoft.com/sharepoint/v3/contenttype/forms">
@@ -48028,22 +48307,6 @@
 </file>
 
 <file path=customXml/itemProps1.xml><?xml version="1.0" encoding="utf-8"?>
-<ds:datastoreItem xmlns:ds="http://schemas.openxmlformats.org/officeDocument/2006/customXml" ds:itemID="{7B6F2769-7194-4217-93D3-3AF3A4742282}">
-  <ds:schemaRefs>
-    <ds:schemaRef ds:uri="http://schemas.microsoft.com/office/2006/documentManagement/types"/>
-    <ds:schemaRef ds:uri="http://schemas.openxmlformats.org/package/2006/metadata/core-properties"/>
-    <ds:schemaRef ds:uri="http://purl.org/dc/dcmitype/"/>
-    <ds:schemaRef ds:uri="http://schemas.microsoft.com/office/infopath/2007/PartnerControls"/>
-    <ds:schemaRef ds:uri="http://purl.org/dc/elements/1.1/"/>
-    <ds:schemaRef ds:uri="http://schemas.microsoft.com/office/2006/metadata/properties"/>
-    <ds:schemaRef ds:uri="http://schemas.microsoft.com/sharepoint/v3/fields"/>
-    <ds:schemaRef ds:uri="http://www.w3.org/XML/1998/namespace"/>
-    <ds:schemaRef ds:uri="http://purl.org/dc/terms/"/>
-  </ds:schemaRefs>
-</ds:datastoreItem>
-</file>
-
-<file path=customXml/itemProps2.xml><?xml version="1.0" encoding="utf-8"?>
 <ds:datastoreItem xmlns:ds="http://schemas.openxmlformats.org/officeDocument/2006/customXml" ds:itemID="{E4214858-785C-42F7-BE66-6D0E79395FC8}">
   <ds:schemaRefs>
     <ds:schemaRef ds:uri="http://schemas.microsoft.com/office/2006/metadata/contentType"/>
@@ -48061,6 +48324,22 @@
 </ds:datastoreItem>
 </file>
 
+<file path=customXml/itemProps2.xml><?xml version="1.0" encoding="utf-8"?>
+<ds:datastoreItem xmlns:ds="http://schemas.openxmlformats.org/officeDocument/2006/customXml" ds:itemID="{7B6F2769-7194-4217-93D3-3AF3A4742282}">
+  <ds:schemaRefs>
+    <ds:schemaRef ds:uri="http://schemas.microsoft.com/office/2006/documentManagement/types"/>
+    <ds:schemaRef ds:uri="http://schemas.openxmlformats.org/package/2006/metadata/core-properties"/>
+    <ds:schemaRef ds:uri="http://purl.org/dc/dcmitype/"/>
+    <ds:schemaRef ds:uri="http://schemas.microsoft.com/office/infopath/2007/PartnerControls"/>
+    <ds:schemaRef ds:uri="http://purl.org/dc/elements/1.1/"/>
+    <ds:schemaRef ds:uri="http://schemas.microsoft.com/office/2006/metadata/properties"/>
+    <ds:schemaRef ds:uri="http://schemas.microsoft.com/sharepoint/v3/fields"/>
+    <ds:schemaRef ds:uri="http://www.w3.org/XML/1998/namespace"/>
+    <ds:schemaRef ds:uri="http://purl.org/dc/terms/"/>
+  </ds:schemaRefs>
+</ds:datastoreItem>
+</file>
+
 <file path=customXml/itemProps3.xml><?xml version="1.0" encoding="utf-8"?>
 <ds:datastoreItem xmlns:ds="http://schemas.openxmlformats.org/officeDocument/2006/customXml" ds:itemID="{87D2A1B0-FF3E-4009-940D-AED0EB70AA20}">
   <ds:schemaRefs>

</xml_diff>